<commit_message>
Update Ton vinh Chan than lyric
</commit_message>
<xml_diff>
--- a/聯合崇拜流程.pptx
+++ b/聯合崇拜流程.pptx
@@ -244,7 +244,7 @@
             <a:fld id="{2F30D4D0-EAC7-4980-A92D-C26C9148BA0F}" type="datetimeFigureOut">
               <a:rPr lang="zh-TW" altLang="en-US" smtClean="0"/>
               <a:pPr/>
-              <a:t>2020/6/6</a:t>
+              <a:t>2020/6/20</a:t>
             </a:fld>
             <a:endParaRPr lang="zh-TW" altLang="en-US"/>
           </a:p>
@@ -1485,7 +1485,7 @@
             <a:fld id="{5BBEAD13-0566-4C6C-97E7-55F17F24B09F}" type="datetimeFigureOut">
               <a:rPr lang="zh-TW" altLang="en-US" smtClean="0"/>
               <a:pPr/>
-              <a:t>2020/6/6</a:t>
+              <a:t>2020/6/20</a:t>
             </a:fld>
             <a:endParaRPr lang="zh-TW" altLang="en-US"/>
           </a:p>
@@ -1652,7 +1652,7 @@
             <a:fld id="{5BBEAD13-0566-4C6C-97E7-55F17F24B09F}" type="datetimeFigureOut">
               <a:rPr lang="zh-TW" altLang="en-US" smtClean="0"/>
               <a:pPr/>
-              <a:t>2020/6/6</a:t>
+              <a:t>2020/6/20</a:t>
             </a:fld>
             <a:endParaRPr lang="zh-TW" altLang="en-US"/>
           </a:p>
@@ -1829,7 +1829,7 @@
             <a:fld id="{5BBEAD13-0566-4C6C-97E7-55F17F24B09F}" type="datetimeFigureOut">
               <a:rPr lang="zh-TW" altLang="en-US" smtClean="0"/>
               <a:pPr/>
-              <a:t>2020/6/6</a:t>
+              <a:t>2020/6/20</a:t>
             </a:fld>
             <a:endParaRPr lang="zh-TW" altLang="en-US"/>
           </a:p>
@@ -1996,7 +1996,7 @@
             <a:fld id="{5BBEAD13-0566-4C6C-97E7-55F17F24B09F}" type="datetimeFigureOut">
               <a:rPr lang="zh-TW" altLang="en-US" smtClean="0"/>
               <a:pPr/>
-              <a:t>2020/6/6</a:t>
+              <a:t>2020/6/20</a:t>
             </a:fld>
             <a:endParaRPr lang="zh-TW" altLang="en-US"/>
           </a:p>
@@ -2239,7 +2239,7 @@
             <a:fld id="{5BBEAD13-0566-4C6C-97E7-55F17F24B09F}" type="datetimeFigureOut">
               <a:rPr lang="zh-TW" altLang="en-US" smtClean="0"/>
               <a:pPr/>
-              <a:t>2020/6/6</a:t>
+              <a:t>2020/6/20</a:t>
             </a:fld>
             <a:endParaRPr lang="zh-TW" altLang="en-US"/>
           </a:p>
@@ -2524,7 +2524,7 @@
             <a:fld id="{5BBEAD13-0566-4C6C-97E7-55F17F24B09F}" type="datetimeFigureOut">
               <a:rPr lang="zh-TW" altLang="en-US" smtClean="0"/>
               <a:pPr/>
-              <a:t>2020/6/6</a:t>
+              <a:t>2020/6/20</a:t>
             </a:fld>
             <a:endParaRPr lang="zh-TW" altLang="en-US"/>
           </a:p>
@@ -2943,7 +2943,7 @@
             <a:fld id="{5BBEAD13-0566-4C6C-97E7-55F17F24B09F}" type="datetimeFigureOut">
               <a:rPr lang="zh-TW" altLang="en-US" smtClean="0"/>
               <a:pPr/>
-              <a:t>2020/6/6</a:t>
+              <a:t>2020/6/20</a:t>
             </a:fld>
             <a:endParaRPr lang="zh-TW" altLang="en-US"/>
           </a:p>
@@ -3058,7 +3058,7 @@
             <a:fld id="{5BBEAD13-0566-4C6C-97E7-55F17F24B09F}" type="datetimeFigureOut">
               <a:rPr lang="zh-TW" altLang="en-US" smtClean="0"/>
               <a:pPr/>
-              <a:t>2020/6/6</a:t>
+              <a:t>2020/6/20</a:t>
             </a:fld>
             <a:endParaRPr lang="zh-TW" altLang="en-US"/>
           </a:p>
@@ -3150,7 +3150,7 @@
             <a:fld id="{5BBEAD13-0566-4C6C-97E7-55F17F24B09F}" type="datetimeFigureOut">
               <a:rPr lang="zh-TW" altLang="en-US" smtClean="0"/>
               <a:pPr/>
-              <a:t>2020/6/6</a:t>
+              <a:t>2020/6/20</a:t>
             </a:fld>
             <a:endParaRPr lang="zh-TW" altLang="en-US"/>
           </a:p>
@@ -3424,7 +3424,7 @@
             <a:fld id="{5BBEAD13-0566-4C6C-97E7-55F17F24B09F}" type="datetimeFigureOut">
               <a:rPr lang="zh-TW" altLang="en-US" smtClean="0"/>
               <a:pPr/>
-              <a:t>2020/6/6</a:t>
+              <a:t>2020/6/20</a:t>
             </a:fld>
             <a:endParaRPr lang="zh-TW" altLang="en-US"/>
           </a:p>
@@ -3678,7 +3678,7 @@
             <a:fld id="{5BBEAD13-0566-4C6C-97E7-55F17F24B09F}" type="datetimeFigureOut">
               <a:rPr lang="zh-TW" altLang="en-US" smtClean="0"/>
               <a:pPr/>
-              <a:t>2020/6/6</a:t>
+              <a:t>2020/6/20</a:t>
             </a:fld>
             <a:endParaRPr lang="zh-TW" altLang="en-US"/>
           </a:p>
@@ -3893,7 +3893,7 @@
             <a:fld id="{5BBEAD13-0566-4C6C-97E7-55F17F24B09F}" type="datetimeFigureOut">
               <a:rPr lang="zh-TW" altLang="en-US" smtClean="0"/>
               <a:pPr/>
-              <a:t>2020/6/6</a:t>
+              <a:t>2020/6/20</a:t>
             </a:fld>
             <a:endParaRPr lang="zh-TW" altLang="en-US"/>
           </a:p>
@@ -7396,7 +7396,22 @@
                   </a:outerShdw>
                 </a:effectLst>
               </a:rPr>
-              <a:t>đất chúng sinh sùng kính khắp nơi</a:t>
+              <a:t>đất chúng </a:t>
+            </a:r>
+            <a:r>
+              <a:rPr lang="vi-VN" sz="2800" b="1" dirty="0" smtClean="0">
+                <a:solidFill>
+                  <a:srgbClr val="660033"/>
+                </a:solidFill>
+                <a:effectLst>
+                  <a:outerShdw blurRad="38100" dist="38100" dir="2700000" algn="tl">
+                    <a:srgbClr val="000000">
+                      <a:alpha val="43137"/>
+                    </a:srgbClr>
+                  </a:outerShdw>
+                </a:effectLst>
+              </a:rPr>
+              <a:t>con cùng hát khắp nơi</a:t>
             </a:r>
             <a:endParaRPr lang="zh-TW" altLang="en-US" sz="2800" b="1" dirty="0">
               <a:solidFill>
@@ -8063,7 +8078,52 @@
                   </a:outerShdw>
                 </a:effectLst>
               </a:rPr>
-              <a:t>Trời cao cũng chung khen ngợi Ba Ngôi</a:t>
+              <a:t>Trời cao cũng chung </a:t>
+            </a:r>
+            <a:r>
+              <a:rPr lang="vi-VN" sz="2800" b="1" dirty="0" smtClean="0">
+                <a:solidFill>
+                  <a:srgbClr val="660033"/>
+                </a:solidFill>
+                <a:effectLst>
+                  <a:outerShdw blurRad="38100" dist="38100" dir="2700000" algn="tl">
+                    <a:srgbClr val="000000">
+                      <a:alpha val="43137"/>
+                    </a:srgbClr>
+                  </a:outerShdw>
+                </a:effectLst>
+              </a:rPr>
+              <a:t>ca</a:t>
+            </a:r>
+            <a:r>
+              <a:rPr lang="vi-VN" sz="2800" b="1" dirty="0" smtClean="0">
+                <a:solidFill>
+                  <a:srgbClr val="660033"/>
+                </a:solidFill>
+                <a:effectLst>
+                  <a:outerShdw blurRad="38100" dist="38100" dir="2700000" algn="tl">
+                    <a:srgbClr val="000000">
+                      <a:alpha val="43137"/>
+                    </a:srgbClr>
+                  </a:outerShdw>
+                </a:effectLst>
+              </a:rPr>
+              <a:t> </a:t>
+            </a:r>
+            <a:r>
+              <a:rPr lang="vi-VN" sz="2800" b="1" dirty="0">
+                <a:solidFill>
+                  <a:srgbClr val="660033"/>
+                </a:solidFill>
+                <a:effectLst>
+                  <a:outerShdw blurRad="38100" dist="38100" dir="2700000" algn="tl">
+                    <a:srgbClr val="000000">
+                      <a:alpha val="43137"/>
+                    </a:srgbClr>
+                  </a:outerShdw>
+                </a:effectLst>
+              </a:rPr>
+              <a:t>ngợi Ba Ngôi</a:t>
             </a:r>
             <a:endParaRPr lang="en-US" sz="2800" b="1" dirty="0">
               <a:solidFill>
@@ -8095,7 +8155,127 @@
                   </a:outerShdw>
                 </a:effectLst>
               </a:rPr>
-              <a:t>Chúa Cha cùng Con với Linh đời đời </a:t>
+              <a:t>Chúa </a:t>
+            </a:r>
+            <a:r>
+              <a:rPr lang="vi-VN" sz="2800" b="1">
+                <a:solidFill>
+                  <a:srgbClr val="660033"/>
+                </a:solidFill>
+                <a:effectLst>
+                  <a:outerShdw blurRad="38100" dist="38100" dir="2700000" algn="tl">
+                    <a:srgbClr val="000000">
+                      <a:alpha val="43137"/>
+                    </a:srgbClr>
+                  </a:outerShdw>
+                </a:effectLst>
+              </a:rPr>
+              <a:t>Cha </a:t>
+            </a:r>
+            <a:r>
+              <a:rPr lang="vi-VN" sz="2800" b="1" smtClean="0">
+                <a:solidFill>
+                  <a:srgbClr val="660033"/>
+                </a:solidFill>
+                <a:effectLst>
+                  <a:outerShdw blurRad="38100" dist="38100" dir="2700000" algn="tl">
+                    <a:srgbClr val="000000">
+                      <a:alpha val="43137"/>
+                    </a:srgbClr>
+                  </a:outerShdw>
+                </a:effectLst>
+              </a:rPr>
+              <a:t>và</a:t>
+            </a:r>
+            <a:r>
+              <a:rPr lang="vi-VN" sz="2800" b="1" smtClean="0">
+                <a:solidFill>
+                  <a:srgbClr val="660033"/>
+                </a:solidFill>
+                <a:effectLst>
+                  <a:outerShdw blurRad="38100" dist="38100" dir="2700000" algn="tl">
+                    <a:srgbClr val="000000">
+                      <a:alpha val="43137"/>
+                    </a:srgbClr>
+                  </a:outerShdw>
+                </a:effectLst>
+              </a:rPr>
+              <a:t> </a:t>
+            </a:r>
+            <a:r>
+              <a:rPr lang="vi-VN" sz="2800" b="1" dirty="0">
+                <a:solidFill>
+                  <a:srgbClr val="660033"/>
+                </a:solidFill>
+                <a:effectLst>
+                  <a:outerShdw blurRad="38100" dist="38100" dir="2700000" algn="tl">
+                    <a:srgbClr val="000000">
+                      <a:alpha val="43137"/>
+                    </a:srgbClr>
+                  </a:outerShdw>
+                </a:effectLst>
+              </a:rPr>
+              <a:t>Con với </a:t>
+            </a:r>
+            <a:r>
+              <a:rPr lang="vi-VN" sz="2800" b="1">
+                <a:solidFill>
+                  <a:srgbClr val="660033"/>
+                </a:solidFill>
+                <a:effectLst>
+                  <a:outerShdw blurRad="38100" dist="38100" dir="2700000" algn="tl">
+                    <a:srgbClr val="000000">
+                      <a:alpha val="43137"/>
+                    </a:srgbClr>
+                  </a:outerShdw>
+                </a:effectLst>
+              </a:rPr>
+              <a:t>Linh </a:t>
+            </a:r>
+            <a:r>
+              <a:rPr lang="vi-VN" sz="2800" b="1" smtClean="0">
+                <a:solidFill>
+                  <a:srgbClr val="660033"/>
+                </a:solidFill>
+                <a:effectLst>
+                  <a:outerShdw blurRad="38100" dist="38100" dir="2700000" algn="tl">
+                    <a:srgbClr val="000000">
+                      <a:alpha val="43137"/>
+                    </a:srgbClr>
+                  </a:outerShdw>
+                </a:effectLst>
+              </a:rPr>
+              <a:t>muôn</a:t>
+            </a:r>
+            <a:r>
+              <a:rPr lang="vi-VN" sz="2800" b="1" smtClean="0">
+                <a:solidFill>
+                  <a:srgbClr val="660033"/>
+                </a:solidFill>
+                <a:effectLst>
+                  <a:outerShdw blurRad="38100" dist="38100" dir="2700000" algn="tl">
+                    <a:srgbClr val="000000">
+                      <a:alpha val="43137"/>
+                    </a:srgbClr>
+                  </a:outerShdw>
+                </a:effectLst>
+              </a:rPr>
+              <a:t> </a:t>
+            </a:r>
+            <a:r>
+              <a:rPr lang="vi-VN" sz="2800" b="1" dirty="0">
+                <a:solidFill>
+                  <a:srgbClr val="660033"/>
+                </a:solidFill>
+                <a:effectLst>
+                  <a:outerShdw blurRad="38100" dist="38100" dir="2700000" algn="tl">
+                    <a:srgbClr val="000000">
+                      <a:alpha val="43137"/>
+                    </a:srgbClr>
+                  </a:outerShdw>
+                </a:effectLst>
+              </a:rPr>
+              <a:t>đời </a:t>
             </a:r>
             <a:endParaRPr lang="en-US" sz="2800" b="1" dirty="0">
               <a:solidFill>

</xml_diff>